<commit_message>
minor Mod 7 change
</commit_message>
<xml_diff>
--- a/Complimentary Course Content/Module7/Lessons/Module7_Lesson2 Configuration Management.pptx
+++ b/Complimentary Course Content/Module7/Lessons/Module7_Lesson2 Configuration Management.pptx
@@ -135,7 +135,7 @@
   </p:defaultTextStyle>
   <p:extLst>
     <p:ext uri="{EFAFB233-063F-42B5-8137-9DF3F51BA10A}">
-      <p15:sldGuideLst xmlns:p15="http://schemas.microsoft.com/office/powerpoint/2012/main" xmlns="">
+      <p15:sldGuideLst xmlns="" xmlns:p15="http://schemas.microsoft.com/office/powerpoint/2012/main">
         <p15:guide id="1" orient="horz" pos="2184" userDrawn="1">
           <p15:clr>
             <a:srgbClr val="A4A3A4"/>
@@ -255,7 +255,7 @@
             <a:fld id="{49B60EF2-7028-489F-85D8-FE86CD7CF2A0}" type="datetimeFigureOut">
               <a:rPr lang="en-US" smtClean="0"/>
               <a:pPr/>
-              <a:t>6/29/16</a:t>
+              <a:t>6/30/16</a:t>
             </a:fld>
             <a:endParaRPr lang="en-US"/>
           </a:p>
@@ -1609,7 +1609,6 @@
               <a:rPr lang="en-US" b="1" dirty="0" smtClean="0"/>
               <a:t>Notes:</a:t>
             </a:r>
-            <a:endParaRPr lang="en-US" b="1" dirty="0" smtClean="0"/>
           </a:p>
           <a:p>
             <a:pPr marL="171450" indent="-171450">
@@ -3770,11 +3769,7 @@
             </a:r>
             <a:r>
               <a:rPr lang="en-US" baseline="0" dirty="0" smtClean="0"/>
-              <a:t> that an Apache web server is installed and started, with a default web page is created with the words “Hello, World!</a:t>
-            </a:r>
-            <a:r>
-              <a:rPr lang="en-US" baseline="0" dirty="0" smtClean="0"/>
-              <a:t>”</a:t>
+              <a:t> that an Apache web server is installed and started, with a default web page is created with the words “Hello, World!”</a:t>
             </a:r>
             <a:endParaRPr lang="en-US" baseline="0" dirty="0"/>
           </a:p>
@@ -4412,7 +4407,7 @@
             <a:fld id="{0459C166-16D3-4A25-A2F8-C51E0E346B22}" type="datetimeFigureOut">
               <a:rPr lang="en-US" smtClean="0"/>
               <a:pPr/>
-              <a:t>6/29/16</a:t>
+              <a:t>6/30/16</a:t>
             </a:fld>
             <a:endParaRPr lang="en-US"/>
           </a:p>
@@ -4781,7 +4776,7 @@
             <a:fld id="{0459C166-16D3-4A25-A2F8-C51E0E346B22}" type="datetimeFigureOut">
               <a:rPr lang="en-US" smtClean="0"/>
               <a:pPr/>
-              <a:t>6/29/16</a:t>
+              <a:t>6/30/16</a:t>
             </a:fld>
             <a:endParaRPr lang="en-US"/>
           </a:p>
@@ -4901,7 +4896,7 @@
             <a:fld id="{0459C166-16D3-4A25-A2F8-C51E0E346B22}" type="datetimeFigureOut">
               <a:rPr lang="en-US" smtClean="0"/>
               <a:pPr/>
-              <a:t>6/29/16</a:t>
+              <a:t>6/30/16</a:t>
             </a:fld>
             <a:endParaRPr lang="en-US"/>
           </a:p>
@@ -5073,7 +5068,7 @@
             <a:fld id="{0459C166-16D3-4A25-A2F8-C51E0E346B22}" type="datetimeFigureOut">
               <a:rPr lang="en-US" smtClean="0"/>
               <a:pPr/>
-              <a:t>6/29/16</a:t>
+              <a:t>6/30/16</a:t>
             </a:fld>
             <a:endParaRPr lang="en-US"/>
           </a:p>
@@ -5339,7 +5334,7 @@
             <a:fld id="{0459C166-16D3-4A25-A2F8-C51E0E346B22}" type="datetimeFigureOut">
               <a:rPr lang="en-US" smtClean="0"/>
               <a:pPr/>
-              <a:t>6/29/16</a:t>
+              <a:t>6/30/16</a:t>
             </a:fld>
             <a:endParaRPr lang="en-US"/>
           </a:p>
@@ -5659,7 +5654,7 @@
             <a:fld id="{0459C166-16D3-4A25-A2F8-C51E0E346B22}" type="datetimeFigureOut">
               <a:rPr lang="en-US" smtClean="0"/>
               <a:pPr/>
-              <a:t>6/29/16</a:t>
+              <a:t>6/30/16</a:t>
             </a:fld>
             <a:endParaRPr lang="en-US"/>
           </a:p>
@@ -6058,7 +6053,7 @@
             <a:fld id="{0459C166-16D3-4A25-A2F8-C51E0E346B22}" type="datetimeFigureOut">
               <a:rPr lang="en-US" smtClean="0"/>
               <a:pPr/>
-              <a:t>6/29/16</a:t>
+              <a:t>6/30/16</a:t>
             </a:fld>
             <a:endParaRPr lang="en-US"/>
           </a:p>
@@ -7030,7 +7025,7 @@
             <a:fld id="{0459C166-16D3-4A25-A2F8-C51E0E346B22}" type="datetimeFigureOut">
               <a:rPr lang="en-US" smtClean="0"/>
               <a:pPr/>
-              <a:t>6/29/16</a:t>
+              <a:t>6/30/16</a:t>
             </a:fld>
             <a:endParaRPr lang="en-US"/>
           </a:p>
@@ -7244,7 +7239,7 @@
             <a:fld id="{0459C166-16D3-4A25-A2F8-C51E0E346B22}" type="datetimeFigureOut">
               <a:rPr lang="en-US" smtClean="0"/>
               <a:pPr/>
-              <a:t>6/29/16</a:t>
+              <a:t>6/30/16</a:t>
             </a:fld>
             <a:endParaRPr lang="en-US"/>
           </a:p>
@@ -16744,7 +16739,11 @@
           <a:p>
             <a:r>
               <a:rPr lang="en-US" sz="4400" dirty="0" smtClean="0"/>
-              <a:t>Defining Configuration Management?</a:t>
+              <a:t>Defining Configuration </a:t>
+            </a:r>
+            <a:r>
+              <a:rPr lang="en-US" sz="4400" dirty="0" smtClean="0"/>
+              <a:t>Management</a:t>
             </a:r>
             <a:endParaRPr lang="en-US" sz="4400" dirty="0"/>
           </a:p>
@@ -17172,7 +17171,15 @@
           <a:p>
             <a:r>
               <a:rPr lang="en-US" sz="4400" dirty="0" smtClean="0"/>
-              <a:t>Example of Configuration Management?</a:t>
+              <a:t>Example of </a:t>
+            </a:r>
+            <a:r>
+              <a:rPr lang="en-US" sz="4400" smtClean="0"/>
+              <a:t>Configuration </a:t>
+            </a:r>
+            <a:r>
+              <a:rPr lang="en-US" sz="4400" smtClean="0"/>
+              <a:t>Management</a:t>
             </a:r>
             <a:endParaRPr lang="en-US" sz="4400" dirty="0"/>
           </a:p>
@@ -18719,7 +18726,7 @@
   <a:extraClrSchemeLst/>
   <a:extLst>
     <a:ext uri="{05A4C25C-085E-4340-85A3-A5531E510DB2}">
-      <thm15:themeFamily xmlns:thm15="http://schemas.microsoft.com/office/thememl/2012/main" xmlns="" name="Office Theme" id="{62F939B6-93AF-4DB8-9C6B-D6C7DFDC589F}" vid="{4A3C46E8-61CC-4603-A589-7422A47A8E4A}"/>
+      <thm15:themeFamily xmlns="" xmlns:thm15="http://schemas.microsoft.com/office/thememl/2012/main" name="Office Theme" id="{62F939B6-93AF-4DB8-9C6B-D6C7DFDC589F}" vid="{4A3C46E8-61CC-4603-A589-7422A47A8E4A}"/>
     </a:ext>
   </a:extLst>
 </a:theme>
@@ -19014,7 +19021,7 @@
   <a:extraClrSchemeLst/>
   <a:extLst>
     <a:ext uri="{05A4C25C-085E-4340-85A3-A5531E510DB2}">
-      <thm15:themeFamily xmlns:thm15="http://schemas.microsoft.com/office/thememl/2012/main" xmlns="" name="Office Theme" id="{62F939B6-93AF-4DB8-9C6B-D6C7DFDC589F}" vid="{4A3C46E8-61CC-4603-A589-7422A47A8E4A}"/>
+      <thm15:themeFamily xmlns="" xmlns:thm15="http://schemas.microsoft.com/office/thememl/2012/main" name="Office Theme" id="{62F939B6-93AF-4DB8-9C6B-D6C7DFDC589F}" vid="{4A3C46E8-61CC-4603-A589-7422A47A8E4A}"/>
     </a:ext>
   </a:extLst>
 </a:theme>

</xml_diff>